<commit_message>
modified files in review 0 and 1
</commit_message>
<xml_diff>
--- a/Review/Review1/Module Designs/Mod2.pptx
+++ b/Review/Review1/Module Designs/Mod2.pptx
@@ -243,7 +243,7 @@
           <a:p>
             <a:fld id="{63A1C593-65D0-4073-BCC9-577B9352EA97}" type="datetimeFigureOut">
               <a:rPr lang="en-US" smtClean="0"/>
-              <a:t>3/30/2022</a:t>
+              <a:t>5/3/2022</a:t>
             </a:fld>
             <a:endParaRPr lang="en-US"/>
           </a:p>
@@ -408,7 +408,7 @@
           <a:p>
             <a:fld id="{63A1C593-65D0-4073-BCC9-577B9352EA97}" type="datetimeFigureOut">
               <a:rPr lang="en-US" smtClean="0"/>
-              <a:t>3/30/2022</a:t>
+              <a:t>5/3/2022</a:t>
             </a:fld>
             <a:endParaRPr lang="en-US"/>
           </a:p>
@@ -583,7 +583,7 @@
           <a:p>
             <a:fld id="{63A1C593-65D0-4073-BCC9-577B9352EA97}" type="datetimeFigureOut">
               <a:rPr lang="en-US" smtClean="0"/>
-              <a:t>3/30/2022</a:t>
+              <a:t>5/3/2022</a:t>
             </a:fld>
             <a:endParaRPr lang="en-US"/>
           </a:p>
@@ -748,7 +748,7 @@
           <a:p>
             <a:fld id="{63A1C593-65D0-4073-BCC9-577B9352EA97}" type="datetimeFigureOut">
               <a:rPr lang="en-US" smtClean="0"/>
-              <a:t>3/30/2022</a:t>
+              <a:t>5/3/2022</a:t>
             </a:fld>
             <a:endParaRPr lang="en-US"/>
           </a:p>
@@ -989,7 +989,7 @@
           <a:p>
             <a:fld id="{63A1C593-65D0-4073-BCC9-577B9352EA97}" type="datetimeFigureOut">
               <a:rPr lang="en-US" smtClean="0"/>
-              <a:t>3/30/2022</a:t>
+              <a:t>5/3/2022</a:t>
             </a:fld>
             <a:endParaRPr lang="en-US"/>
           </a:p>
@@ -1216,7 +1216,7 @@
           <a:p>
             <a:fld id="{63A1C593-65D0-4073-BCC9-577B9352EA97}" type="datetimeFigureOut">
               <a:rPr lang="en-US" smtClean="0"/>
-              <a:t>3/30/2022</a:t>
+              <a:t>5/3/2022</a:t>
             </a:fld>
             <a:endParaRPr lang="en-US"/>
           </a:p>
@@ -1578,7 +1578,7 @@
           <a:p>
             <a:fld id="{63A1C593-65D0-4073-BCC9-577B9352EA97}" type="datetimeFigureOut">
               <a:rPr lang="en-US" smtClean="0"/>
-              <a:t>3/30/2022</a:t>
+              <a:t>5/3/2022</a:t>
             </a:fld>
             <a:endParaRPr lang="en-US"/>
           </a:p>
@@ -1691,7 +1691,7 @@
           <a:p>
             <a:fld id="{63A1C593-65D0-4073-BCC9-577B9352EA97}" type="datetimeFigureOut">
               <a:rPr lang="en-US" smtClean="0"/>
-              <a:t>3/30/2022</a:t>
+              <a:t>5/3/2022</a:t>
             </a:fld>
             <a:endParaRPr lang="en-US"/>
           </a:p>
@@ -1781,7 +1781,7 @@
           <a:p>
             <a:fld id="{63A1C593-65D0-4073-BCC9-577B9352EA97}" type="datetimeFigureOut">
               <a:rPr lang="en-US" smtClean="0"/>
-              <a:t>3/30/2022</a:t>
+              <a:t>5/3/2022</a:t>
             </a:fld>
             <a:endParaRPr lang="en-US"/>
           </a:p>
@@ -2053,7 +2053,7 @@
           <a:p>
             <a:fld id="{63A1C593-65D0-4073-BCC9-577B9352EA97}" type="datetimeFigureOut">
               <a:rPr lang="en-US" smtClean="0"/>
-              <a:t>3/30/2022</a:t>
+              <a:t>5/3/2022</a:t>
             </a:fld>
             <a:endParaRPr lang="en-US"/>
           </a:p>
@@ -2301,7 +2301,7 @@
           <a:p>
             <a:fld id="{63A1C593-65D0-4073-BCC9-577B9352EA97}" type="datetimeFigureOut">
               <a:rPr lang="en-US" smtClean="0"/>
-              <a:t>3/30/2022</a:t>
+              <a:t>5/3/2022</a:t>
             </a:fld>
             <a:endParaRPr lang="en-US"/>
           </a:p>
@@ -2509,7 +2509,7 @@
           <a:p>
             <a:fld id="{63A1C593-65D0-4073-BCC9-577B9352EA97}" type="datetimeFigureOut">
               <a:rPr lang="en-US" smtClean="0"/>
-              <a:t>3/30/2022</a:t>
+              <a:t>5/3/2022</a:t>
             </a:fld>
             <a:endParaRPr lang="en-US"/>
           </a:p>
@@ -3000,19 +3000,81 @@
           </a:fontRef>
         </p:style>
       </p:cxnSp>
+      <p:sp>
+        <p:nvSpPr>
+          <p:cNvPr id="22" name="Rectangles 21"/>
+          <p:cNvSpPr/>
+          <p:nvPr/>
+        </p:nvSpPr>
+        <p:spPr>
+          <a:xfrm>
+            <a:off x="1280160" y="1365250"/>
+            <a:ext cx="4467860" cy="718820"/>
+          </a:xfrm>
+          <a:prstGeom prst="rect">
+            <a:avLst/>
+          </a:prstGeom>
+          <a:ln w="25400">
+            <a:solidFill>
+              <a:schemeClr val="tx1"/>
+            </a:solidFill>
+          </a:ln>
+        </p:spPr>
+        <p:style>
+          <a:lnRef idx="2">
+            <a:schemeClr val="accent6"/>
+          </a:lnRef>
+          <a:fillRef idx="1">
+            <a:schemeClr val="lt1"/>
+          </a:fillRef>
+          <a:effectRef idx="0">
+            <a:schemeClr val="accent6"/>
+          </a:effectRef>
+          <a:fontRef idx="minor">
+            <a:schemeClr val="dk1"/>
+          </a:fontRef>
+        </p:style>
+        <p:txBody>
+          <a:bodyPr rtlCol="0" anchor="ctr"/>
+          <a:lstStyle/>
+          <a:p>
+            <a:pPr algn="ctr"/>
+            <a:r>
+              <a:rPr lang="en-IN" altLang="en-US" sz="2000" dirty="0">
+                <a:latin typeface="Comic Sans MS" panose="030F0702030302020204" pitchFamily="66" charset="0"/>
+                <a:cs typeface="Times New Roman" panose="02020603050405020304" charset="0"/>
+              </a:rPr>
+              <a:t>Manual </a:t>
+            </a:r>
+            <a:r>
+              <a:rPr lang="en-IN" altLang="en-US" sz="2000" dirty="0" smtClean="0">
+                <a:latin typeface="Comic Sans MS" panose="030F0702030302020204" pitchFamily="66" charset="0"/>
+                <a:cs typeface="Times New Roman" panose="02020603050405020304" charset="0"/>
+              </a:rPr>
+              <a:t>Labelling of </a:t>
+            </a:r>
+            <a:r>
+              <a:rPr lang="en-IN" altLang="en-US" sz="2000" dirty="0">
+                <a:latin typeface="Comic Sans MS" panose="030F0702030302020204" pitchFamily="66" charset="0"/>
+                <a:cs typeface="Times New Roman" panose="02020603050405020304" charset="0"/>
+              </a:rPr>
+              <a:t>rooftop types</a:t>
+            </a:r>
+          </a:p>
+        </p:txBody>
+      </p:sp>
       <p:cxnSp>
         <p:nvCxnSpPr>
-          <p:cNvPr id="13" name="Straight Arrow Connector 12"/>
+          <p:cNvPr id="26" name="Straight Arrow Connector 25"/>
           <p:cNvCxnSpPr>
-            <a:stCxn id="33" idx="3"/>
-            <a:endCxn id="32" idx="1"/>
+            <a:endCxn id="3" idx="0"/>
           </p:cNvCxnSpPr>
           <p:nvPr/>
         </p:nvCxnSpPr>
         <p:spPr>
-          <a:xfrm>
-            <a:off x="4545122" y="9063673"/>
-            <a:ext cx="418038" cy="0"/>
+          <a:xfrm flipH="1">
+            <a:off x="3457893" y="2133600"/>
+            <a:ext cx="14922" cy="543560"/>
           </a:xfrm>
           <a:prstGeom prst="straightConnector1">
             <a:avLst/>
@@ -3041,16 +3103,16 @@
       </p:cxnSp>
       <p:sp>
         <p:nvSpPr>
-          <p:cNvPr id="22" name="Rectangles 21"/>
+          <p:cNvPr id="2" name="Oval 1"/>
           <p:cNvSpPr/>
           <p:nvPr/>
         </p:nvSpPr>
         <p:spPr>
           <a:xfrm>
-            <a:off x="1280160" y="1365250"/>
-            <a:ext cx="4467860" cy="718820"/>
-          </a:xfrm>
-          <a:prstGeom prst="rect">
+            <a:off x="2183447" y="145415"/>
+            <a:ext cx="2666365" cy="816610"/>
+          </a:xfrm>
+          <a:prstGeom prst="ellipse">
             <a:avLst/>
           </a:prstGeom>
           <a:ln w="25400">
@@ -3079,41 +3141,127 @@
           <a:p>
             <a:pPr algn="ctr"/>
             <a:r>
-              <a:rPr lang="en-IN" altLang="en-US" sz="2000" dirty="0">
-                <a:latin typeface="Comic Sans MS" panose="030F0702030302020204" pitchFamily="66" charset="0"/>
+              <a:rPr lang="en-IN" altLang="en-US" b="1" dirty="0" smtClean="0">
+                <a:latin typeface="Century Schoolbook" panose="02040604050505020304" pitchFamily="18" charset="0"/>
                 <a:cs typeface="Times New Roman" panose="02020603050405020304" charset="0"/>
               </a:rPr>
-              <a:t>Manual </a:t>
-            </a:r>
-            <a:r>
-              <a:rPr lang="en-IN" altLang="en-US" sz="2000" dirty="0" smtClean="0">
-                <a:latin typeface="Comic Sans MS" panose="030F0702030302020204" pitchFamily="66" charset="0"/>
+              <a:t>EXTRACTED ROOFTOPS</a:t>
+            </a:r>
+            <a:endParaRPr lang="en-IN" altLang="en-US" b="1" dirty="0">
+              <a:latin typeface="Century Schoolbook" panose="02040604050505020304" pitchFamily="18" charset="0"/>
+              <a:cs typeface="Times New Roman" panose="02020603050405020304" charset="0"/>
+            </a:endParaRPr>
+          </a:p>
+        </p:txBody>
+      </p:sp>
+      <p:sp>
+        <p:nvSpPr>
+          <p:cNvPr id="3" name="Rectangles 2"/>
+          <p:cNvSpPr/>
+          <p:nvPr/>
+        </p:nvSpPr>
+        <p:spPr>
+          <a:xfrm>
+            <a:off x="789305" y="2677160"/>
+            <a:ext cx="5337175" cy="1748790"/>
+          </a:xfrm>
+          <a:prstGeom prst="rect">
+            <a:avLst/>
+          </a:prstGeom>
+          <a:ln w="25400">
+            <a:solidFill>
+              <a:schemeClr val="tx1"/>
+            </a:solidFill>
+          </a:ln>
+        </p:spPr>
+        <p:style>
+          <a:lnRef idx="2">
+            <a:schemeClr val="accent6"/>
+          </a:lnRef>
+          <a:fillRef idx="1">
+            <a:schemeClr val="lt1"/>
+          </a:fillRef>
+          <a:effectRef idx="0">
+            <a:schemeClr val="accent6"/>
+          </a:effectRef>
+          <a:fontRef idx="minor">
+            <a:schemeClr val="dk1"/>
+          </a:fontRef>
+        </p:style>
+        <p:txBody>
+          <a:bodyPr rtlCol="0" anchor="t" anchorCtr="0"/>
+          <a:lstStyle/>
+          <a:p>
+            <a:pPr algn="ctr"/>
+            <a:r>
+              <a:rPr lang="en-IN" altLang="en-US" sz="2400" dirty="0">
+                <a:latin typeface="Times New Roman" panose="02020603050405020304" charset="0"/>
                 <a:cs typeface="Times New Roman" panose="02020603050405020304" charset="0"/>
               </a:rPr>
-              <a:t>Labelling of </a:t>
-            </a:r>
-            <a:r>
-              <a:rPr lang="en-IN" altLang="en-US" sz="2000" dirty="0">
-                <a:latin typeface="Comic Sans MS" panose="030F0702030302020204" pitchFamily="66" charset="0"/>
+              <a:t>DATA AUGMENTATION</a:t>
+            </a:r>
+          </a:p>
+        </p:txBody>
+      </p:sp>
+      <p:sp>
+        <p:nvSpPr>
+          <p:cNvPr id="18" name="Rectangles 17"/>
+          <p:cNvSpPr/>
+          <p:nvPr/>
+        </p:nvSpPr>
+        <p:spPr>
+          <a:xfrm>
+            <a:off x="182880" y="4897754"/>
+            <a:ext cx="6507480" cy="2854325"/>
+          </a:xfrm>
+          <a:prstGeom prst="rect">
+            <a:avLst/>
+          </a:prstGeom>
+          <a:ln w="25400">
+            <a:solidFill>
+              <a:schemeClr val="tx1"/>
+            </a:solidFill>
+          </a:ln>
+        </p:spPr>
+        <p:style>
+          <a:lnRef idx="2">
+            <a:schemeClr val="accent6"/>
+          </a:lnRef>
+          <a:fillRef idx="1">
+            <a:schemeClr val="lt1"/>
+          </a:fillRef>
+          <a:effectRef idx="0">
+            <a:schemeClr val="accent6"/>
+          </a:effectRef>
+          <a:fontRef idx="minor">
+            <a:schemeClr val="dk1"/>
+          </a:fontRef>
+        </p:style>
+        <p:txBody>
+          <a:bodyPr rtlCol="0" anchor="t" anchorCtr="0"/>
+          <a:lstStyle/>
+          <a:p>
+            <a:pPr algn="ctr"/>
+            <a:r>
+              <a:rPr lang="en-IN" altLang="en-US" sz="2400" dirty="0">
+                <a:latin typeface="Times New Roman" panose="02020603050405020304" charset="0"/>
                 <a:cs typeface="Times New Roman" panose="02020603050405020304" charset="0"/>
               </a:rPr>
-              <a:t>rooftop types</a:t>
+              <a:t>COMPARISON OF DIFFERENT MODELS</a:t>
             </a:r>
           </a:p>
         </p:txBody>
       </p:sp>
       <p:cxnSp>
         <p:nvCxnSpPr>
-          <p:cNvPr id="26" name="Straight Arrow Connector 25"/>
-          <p:cNvCxnSpPr>
-            <a:endCxn id="3" idx="0"/>
-          </p:cNvCxnSpPr>
+          <p:cNvPr id="29" name="Straight Arrow Connector 28"/>
+          <p:cNvCxnSpPr/>
           <p:nvPr/>
         </p:nvCxnSpPr>
         <p:spPr>
-          <a:xfrm flipH="1">
-            <a:off x="3457893" y="2133600"/>
-            <a:ext cx="14922" cy="543560"/>
+          <a:xfrm>
+            <a:off x="3502660" y="962660"/>
+            <a:ext cx="13970" cy="402590"/>
           </a:xfrm>
           <a:prstGeom prst="straightConnector1">
             <a:avLst/>
@@ -3142,16 +3290,16 @@
       </p:cxnSp>
       <p:sp>
         <p:nvSpPr>
-          <p:cNvPr id="2" name="Oval 1"/>
+          <p:cNvPr id="31" name="Rectangles 30"/>
           <p:cNvSpPr/>
           <p:nvPr/>
         </p:nvSpPr>
         <p:spPr>
           <a:xfrm>
-            <a:off x="2183447" y="145415"/>
-            <a:ext cx="2666365" cy="816610"/>
-          </a:xfrm>
-          <a:prstGeom prst="ellipse">
+            <a:off x="3250992" y="8748058"/>
+            <a:ext cx="1712168" cy="626745"/>
+          </a:xfrm>
+          <a:prstGeom prst="rect">
             <a:avLst/>
           </a:prstGeom>
           <a:ln w="25400">
@@ -3180,296 +3328,11 @@
           <a:p>
             <a:pPr algn="ctr"/>
             <a:r>
-              <a:rPr lang="en-IN" altLang="en-US" b="1" dirty="0" smtClean="0">
-                <a:latin typeface="Century Schoolbook" panose="02040604050505020304" pitchFamily="18" charset="0"/>
-                <a:cs typeface="Times New Roman" panose="02020603050405020304" charset="0"/>
-              </a:rPr>
-              <a:t>EXTRACTED ROOFTOPS</a:t>
-            </a:r>
-            <a:endParaRPr lang="en-IN" altLang="en-US" b="1" dirty="0">
-              <a:latin typeface="Century Schoolbook" panose="02040604050505020304" pitchFamily="18" charset="0"/>
-              <a:cs typeface="Times New Roman" panose="02020603050405020304" charset="0"/>
-            </a:endParaRPr>
-          </a:p>
-        </p:txBody>
-      </p:sp>
-      <p:sp>
-        <p:nvSpPr>
-          <p:cNvPr id="3" name="Rectangles 2"/>
-          <p:cNvSpPr/>
-          <p:nvPr/>
-        </p:nvSpPr>
-        <p:spPr>
-          <a:xfrm>
-            <a:off x="789305" y="2677160"/>
-            <a:ext cx="5337175" cy="1748790"/>
-          </a:xfrm>
-          <a:prstGeom prst="rect">
-            <a:avLst/>
-          </a:prstGeom>
-          <a:ln w="25400">
-            <a:solidFill>
-              <a:schemeClr val="tx1"/>
-            </a:solidFill>
-          </a:ln>
-        </p:spPr>
-        <p:style>
-          <a:lnRef idx="2">
-            <a:schemeClr val="accent6"/>
-          </a:lnRef>
-          <a:fillRef idx="1">
-            <a:schemeClr val="lt1"/>
-          </a:fillRef>
-          <a:effectRef idx="0">
-            <a:schemeClr val="accent6"/>
-          </a:effectRef>
-          <a:fontRef idx="minor">
-            <a:schemeClr val="dk1"/>
-          </a:fontRef>
-        </p:style>
-        <p:txBody>
-          <a:bodyPr rtlCol="0" anchor="t" anchorCtr="0"/>
-          <a:lstStyle/>
-          <a:p>
-            <a:pPr algn="ctr"/>
-            <a:r>
-              <a:rPr lang="en-IN" altLang="en-US" sz="2400" dirty="0">
-                <a:latin typeface="Times New Roman" panose="02020603050405020304" charset="0"/>
-                <a:cs typeface="Times New Roman" panose="02020603050405020304" charset="0"/>
-              </a:rPr>
-              <a:t>DATA AUGMENTATION</a:t>
-            </a:r>
-          </a:p>
-        </p:txBody>
-      </p:sp>
-      <p:sp>
-        <p:nvSpPr>
-          <p:cNvPr id="18" name="Rectangles 17"/>
-          <p:cNvSpPr/>
-          <p:nvPr/>
-        </p:nvSpPr>
-        <p:spPr>
-          <a:xfrm>
-            <a:off x="182880" y="4897754"/>
-            <a:ext cx="6507480" cy="2854325"/>
-          </a:xfrm>
-          <a:prstGeom prst="rect">
-            <a:avLst/>
-          </a:prstGeom>
-          <a:ln w="25400">
-            <a:solidFill>
-              <a:schemeClr val="tx1"/>
-            </a:solidFill>
-          </a:ln>
-        </p:spPr>
-        <p:style>
-          <a:lnRef idx="2">
-            <a:schemeClr val="accent6"/>
-          </a:lnRef>
-          <a:fillRef idx="1">
-            <a:schemeClr val="lt1"/>
-          </a:fillRef>
-          <a:effectRef idx="0">
-            <a:schemeClr val="accent6"/>
-          </a:effectRef>
-          <a:fontRef idx="minor">
-            <a:schemeClr val="dk1"/>
-          </a:fontRef>
-        </p:style>
-        <p:txBody>
-          <a:bodyPr rtlCol="0" anchor="t" anchorCtr="0"/>
-          <a:lstStyle/>
-          <a:p>
-            <a:pPr algn="ctr"/>
-            <a:r>
-              <a:rPr lang="en-IN" altLang="en-US" sz="2400" dirty="0">
-                <a:latin typeface="Times New Roman" panose="02020603050405020304" charset="0"/>
-                <a:cs typeface="Times New Roman" panose="02020603050405020304" charset="0"/>
-              </a:rPr>
-              <a:t>COMPARISON OF DIFFERENT MODELS</a:t>
-            </a:r>
-          </a:p>
-        </p:txBody>
-      </p:sp>
-      <p:cxnSp>
-        <p:nvCxnSpPr>
-          <p:cNvPr id="29" name="Straight Arrow Connector 28"/>
-          <p:cNvCxnSpPr/>
-          <p:nvPr/>
-        </p:nvCxnSpPr>
-        <p:spPr>
-          <a:xfrm>
-            <a:off x="3502660" y="962660"/>
-            <a:ext cx="13970" cy="402590"/>
-          </a:xfrm>
-          <a:prstGeom prst="straightConnector1">
-            <a:avLst/>
-          </a:prstGeom>
-          <a:ln w="28575">
-            <a:solidFill>
-              <a:srgbClr val="000099"/>
-            </a:solidFill>
-            <a:tailEnd type="arrow"/>
-          </a:ln>
-        </p:spPr>
-        <p:style>
-          <a:lnRef idx="1">
-            <a:schemeClr val="accent1"/>
-          </a:lnRef>
-          <a:fillRef idx="0">
-            <a:schemeClr val="accent1"/>
-          </a:fillRef>
-          <a:effectRef idx="0">
-            <a:schemeClr val="accent1"/>
-          </a:effectRef>
-          <a:fontRef idx="minor">
-            <a:schemeClr val="tx1"/>
-          </a:fontRef>
-        </p:style>
-      </p:cxnSp>
-      <p:sp>
-        <p:nvSpPr>
-          <p:cNvPr id="31" name="Rectangles 30"/>
-          <p:cNvSpPr/>
-          <p:nvPr/>
-        </p:nvSpPr>
-        <p:spPr>
-          <a:xfrm>
-            <a:off x="4545123" y="9815195"/>
-            <a:ext cx="1712168" cy="626745"/>
-          </a:xfrm>
-          <a:prstGeom prst="rect">
-            <a:avLst/>
-          </a:prstGeom>
-          <a:ln w="25400">
-            <a:solidFill>
-              <a:schemeClr val="tx1"/>
-            </a:solidFill>
-          </a:ln>
-        </p:spPr>
-        <p:style>
-          <a:lnRef idx="2">
-            <a:schemeClr val="accent6"/>
-          </a:lnRef>
-          <a:fillRef idx="1">
-            <a:schemeClr val="lt1"/>
-          </a:fillRef>
-          <a:effectRef idx="0">
-            <a:schemeClr val="accent6"/>
-          </a:effectRef>
-          <a:fontRef idx="minor">
-            <a:schemeClr val="dk1"/>
-          </a:fontRef>
-        </p:style>
-        <p:txBody>
-          <a:bodyPr rtlCol="0" anchor="ctr"/>
-          <a:lstStyle/>
-          <a:p>
-            <a:pPr algn="ctr"/>
-            <a:r>
               <a:rPr lang="en-IN" altLang="en-US" dirty="0">
                 <a:latin typeface="Comic Sans MS" panose="030F0702030302020204" pitchFamily="66" charset="0"/>
                 <a:cs typeface="Times New Roman" panose="02020603050405020304" charset="0"/>
               </a:rPr>
               <a:t>Gaussian Blur</a:t>
-            </a:r>
-          </a:p>
-        </p:txBody>
-      </p:sp>
-      <p:sp>
-        <p:nvSpPr>
-          <p:cNvPr id="32" name="Rectangles 31"/>
-          <p:cNvSpPr/>
-          <p:nvPr/>
-        </p:nvSpPr>
-        <p:spPr>
-          <a:xfrm>
-            <a:off x="4963160" y="8721090"/>
-            <a:ext cx="1294130" cy="685165"/>
-          </a:xfrm>
-          <a:prstGeom prst="rect">
-            <a:avLst/>
-          </a:prstGeom>
-          <a:ln w="25400">
-            <a:solidFill>
-              <a:schemeClr val="tx1"/>
-            </a:solidFill>
-          </a:ln>
-        </p:spPr>
-        <p:style>
-          <a:lnRef idx="2">
-            <a:schemeClr val="accent6"/>
-          </a:lnRef>
-          <a:fillRef idx="1">
-            <a:schemeClr val="lt1"/>
-          </a:fillRef>
-          <a:effectRef idx="0">
-            <a:schemeClr val="accent6"/>
-          </a:effectRef>
-          <a:fontRef idx="minor">
-            <a:schemeClr val="dk1"/>
-          </a:fontRef>
-        </p:style>
-        <p:txBody>
-          <a:bodyPr rtlCol="0" anchor="ctr"/>
-          <a:lstStyle/>
-          <a:p>
-            <a:pPr algn="ctr"/>
-            <a:r>
-              <a:rPr lang="en-IN" altLang="en-US" dirty="0">
-                <a:latin typeface="Comic Sans MS" panose="030F0702030302020204" pitchFamily="66" charset="0"/>
-                <a:cs typeface="Times New Roman" panose="02020603050405020304" charset="0"/>
-              </a:rPr>
-              <a:t>FHH</a:t>
-            </a:r>
-          </a:p>
-        </p:txBody>
-      </p:sp>
-      <p:sp>
-        <p:nvSpPr>
-          <p:cNvPr id="33" name="Rectangles 32"/>
-          <p:cNvSpPr/>
-          <p:nvPr/>
-        </p:nvSpPr>
-        <p:spPr>
-          <a:xfrm>
-            <a:off x="2735580" y="8717915"/>
-            <a:ext cx="1809542" cy="691515"/>
-          </a:xfrm>
-          <a:prstGeom prst="rect">
-            <a:avLst/>
-          </a:prstGeom>
-          <a:ln w="25400">
-            <a:solidFill>
-              <a:schemeClr val="tx1"/>
-            </a:solidFill>
-          </a:ln>
-        </p:spPr>
-        <p:style>
-          <a:lnRef idx="2">
-            <a:schemeClr val="accent6"/>
-          </a:lnRef>
-          <a:fillRef idx="1">
-            <a:schemeClr val="lt1"/>
-          </a:fillRef>
-          <a:effectRef idx="0">
-            <a:schemeClr val="accent6"/>
-          </a:effectRef>
-          <a:fontRef idx="minor">
-            <a:schemeClr val="dk1"/>
-          </a:fontRef>
-        </p:style>
-        <p:txBody>
-          <a:bodyPr rtlCol="0" anchor="ctr"/>
-          <a:lstStyle/>
-          <a:p>
-            <a:pPr algn="ctr"/>
-            <a:r>
-              <a:rPr lang="en-IN" altLang="en-US" dirty="0">
-                <a:latin typeface="Comic Sans MS" panose="030F0702030302020204" pitchFamily="66" charset="0"/>
-                <a:cs typeface="Times New Roman" panose="02020603050405020304" charset="0"/>
-              </a:rPr>
-              <a:t>Contrast Normalisation</a:t>
             </a:r>
           </a:p>
         </p:txBody>
@@ -3617,15 +3480,13 @@
       <p:cxnSp>
         <p:nvCxnSpPr>
           <p:cNvPr id="42" name="Straight Arrow Connector 41"/>
-          <p:cNvCxnSpPr>
-            <a:stCxn id="32" idx="2"/>
-          </p:cNvCxnSpPr>
+          <p:cNvCxnSpPr/>
           <p:nvPr/>
         </p:nvCxnSpPr>
         <p:spPr>
           <a:xfrm flipH="1">
-            <a:off x="5608320" y="9406255"/>
-            <a:ext cx="1905" cy="408940"/>
+            <a:off x="4135120" y="10128885"/>
+            <a:ext cx="1497454" cy="0"/>
           </a:xfrm>
           <a:prstGeom prst="straightConnector1">
             <a:avLst/>
@@ -3657,53 +3518,14 @@
           <p:cNvPr id="43" name="Straight Arrow Connector 42"/>
           <p:cNvCxnSpPr>
             <a:stCxn id="34" idx="3"/>
-            <a:endCxn id="33" idx="1"/>
+            <a:endCxn id="31" idx="1"/>
           </p:cNvCxnSpPr>
           <p:nvPr/>
         </p:nvCxnSpPr>
         <p:spPr>
           <a:xfrm>
             <a:off x="2083435" y="9054783"/>
-            <a:ext cx="652145" cy="8890"/>
-          </a:xfrm>
-          <a:prstGeom prst="straightConnector1">
-            <a:avLst/>
-          </a:prstGeom>
-          <a:ln w="28575">
-            <a:solidFill>
-              <a:srgbClr val="000099"/>
-            </a:solidFill>
-            <a:tailEnd type="arrow"/>
-          </a:ln>
-        </p:spPr>
-        <p:style>
-          <a:lnRef idx="1">
-            <a:schemeClr val="accent1"/>
-          </a:lnRef>
-          <a:fillRef idx="0">
-            <a:schemeClr val="accent1"/>
-          </a:fillRef>
-          <a:effectRef idx="0">
-            <a:schemeClr val="accent1"/>
-          </a:effectRef>
-          <a:fontRef idx="minor">
-            <a:schemeClr val="tx1"/>
-          </a:fontRef>
-        </p:style>
-      </p:cxnSp>
-      <p:cxnSp>
-        <p:nvCxnSpPr>
-          <p:cNvPr id="44" name="Straight Arrow Connector 43"/>
-          <p:cNvCxnSpPr>
-            <a:stCxn id="31" idx="1"/>
-            <a:endCxn id="35" idx="3"/>
-          </p:cNvCxnSpPr>
-          <p:nvPr/>
-        </p:nvCxnSpPr>
-        <p:spPr>
-          <a:xfrm flipH="1">
-            <a:off x="4156710" y="10128568"/>
-            <a:ext cx="388413" cy="317"/>
+            <a:ext cx="1167557" cy="6648"/>
           </a:xfrm>
           <a:prstGeom prst="straightConnector1">
             <a:avLst/>
@@ -4418,6 +4240,78 @@
           </a:p>
         </p:txBody>
       </p:sp>
+      <p:cxnSp>
+        <p:nvCxnSpPr>
+          <p:cNvPr id="11" name="Straight Connector 10"/>
+          <p:cNvCxnSpPr>
+            <a:stCxn id="31" idx="3"/>
+          </p:cNvCxnSpPr>
+          <p:nvPr/>
+        </p:nvCxnSpPr>
+        <p:spPr>
+          <a:xfrm flipV="1">
+            <a:off x="4963160" y="9061430"/>
+            <a:ext cx="645160" cy="1"/>
+          </a:xfrm>
+          <a:prstGeom prst="line">
+            <a:avLst/>
+          </a:prstGeom>
+          <a:ln w="28575">
+            <a:solidFill>
+              <a:srgbClr val="000099"/>
+            </a:solidFill>
+          </a:ln>
+        </p:spPr>
+        <p:style>
+          <a:lnRef idx="1">
+            <a:schemeClr val="accent1"/>
+          </a:lnRef>
+          <a:fillRef idx="0">
+            <a:schemeClr val="accent1"/>
+          </a:fillRef>
+          <a:effectRef idx="0">
+            <a:schemeClr val="accent1"/>
+          </a:effectRef>
+          <a:fontRef idx="minor">
+            <a:schemeClr val="tx1"/>
+          </a:fontRef>
+        </p:style>
+      </p:cxnSp>
+      <p:cxnSp>
+        <p:nvCxnSpPr>
+          <p:cNvPr id="51" name="Straight Connector 50"/>
+          <p:cNvCxnSpPr/>
+          <p:nvPr/>
+        </p:nvCxnSpPr>
+        <p:spPr>
+          <a:xfrm>
+            <a:off x="5608320" y="9059710"/>
+            <a:ext cx="24254" cy="1069175"/>
+          </a:xfrm>
+          <a:prstGeom prst="line">
+            <a:avLst/>
+          </a:prstGeom>
+          <a:ln w="28575">
+            <a:solidFill>
+              <a:srgbClr val="000099"/>
+            </a:solidFill>
+          </a:ln>
+        </p:spPr>
+        <p:style>
+          <a:lnRef idx="1">
+            <a:schemeClr val="accent1"/>
+          </a:lnRef>
+          <a:fillRef idx="0">
+            <a:schemeClr val="accent1"/>
+          </a:fillRef>
+          <a:effectRef idx="0">
+            <a:schemeClr val="accent1"/>
+          </a:effectRef>
+          <a:fontRef idx="minor">
+            <a:schemeClr val="tx1"/>
+          </a:fontRef>
+        </p:style>
+      </p:cxnSp>
     </p:spTree>
   </p:cSld>
   <p:clrMapOvr>

</xml_diff>